<commit_message>
final final updated presentation
</commit_message>
<xml_diff>
--- a/TED TALKS  TEEN Tobacco  Nicotine Usage Trends FINAL.pptx
+++ b/TED TALKS  TEEN Tobacco  Nicotine Usage Trends FINAL.pptx
@@ -5747,7 +5747,7 @@
           <a:p>
             <a:r>
               <a:rPr lang="en-US" dirty="0"/>
-              <a:t>Boxplot for Comparting Variance in Ethnicity</a:t>
+              <a:t>Boxplot for Comparing Variance in Ethnicity</a:t>
             </a:r>
           </a:p>
         </p:txBody>
@@ -8909,7 +8909,7 @@
             </a:pPr>
             <a:r>
               <a:rPr lang="en-US" sz="2800" dirty="0"/>
-              <a:t>Is there a significant increase in teen e-cigarette usage?</a:t>
+              <a:t>Is there a significant change in teen e-cigarette usage?</a:t>
             </a:r>
           </a:p>
           <a:p>
@@ -8929,7 +8929,7 @@
             </a:pPr>
             <a:r>
               <a:rPr lang="en-US" sz="2800" dirty="0"/>
-              <a:t>Are their any differences in gender and ethnicity in the percentage of E-cigarette  users?</a:t>
+              <a:t>Are their differences in gender and ethnicity in the percentage of E-cigarette  users?</a:t>
             </a:r>
           </a:p>
         </p:txBody>

</xml_diff>